<commit_message>
Continued with pptx... #68
</commit_message>
<xml_diff>
--- a/documents/00_Sitzungen/Meilenstein_3/Meilenstein_3.pptx
+++ b/documents/00_Sitzungen/Meilenstein_3/Meilenstein_3.pptx
@@ -247,7 +247,7 @@
           <a:p>
             <a:fld id="{51E9AE21-7CC6-4817-AF11-878DED5D1B64}" type="datetimeFigureOut">
               <a:rPr lang="en-GB" smtClean="0"/>
-              <a:t>01/04/2016</a:t>
+              <a:t>21/04/2016</a:t>
             </a:fld>
             <a:endParaRPr lang="en-GB"/>
           </a:p>
@@ -406,7 +406,7 @@
           <a:p>
             <a:fld id="{42219948-3B23-4123-8C0A-8C107FD10B5E}" type="slidenum">
               <a:rPr lang="en-GB" smtClean="0"/>
-              <a:t>‹#›</a:t>
+              <a:t>‹Nr.›</a:t>
             </a:fld>
             <a:endParaRPr lang="en-GB"/>
           </a:p>
@@ -860,7 +860,7 @@
               <a:pPr>
                 <a:defRPr/>
               </a:pPr>
-              <a:t>‹#›</a:t>
+              <a:t>‹Nr.›</a:t>
             </a:fld>
             <a:endParaRPr lang="es-ES" altLang="de-DE"/>
           </a:p>
@@ -1056,7 +1056,7 @@
               <a:pPr>
                 <a:defRPr/>
               </a:pPr>
-              <a:t>‹#›</a:t>
+              <a:t>‹Nr.›</a:t>
             </a:fld>
             <a:endParaRPr lang="es-ES" altLang="de-DE"/>
           </a:p>
@@ -1262,7 +1262,7 @@
               <a:pPr>
                 <a:defRPr/>
               </a:pPr>
-              <a:t>‹#›</a:t>
+              <a:t>‹Nr.›</a:t>
             </a:fld>
             <a:endParaRPr lang="es-ES" altLang="de-DE"/>
           </a:p>
@@ -1462,7 +1462,7 @@
               <a:pPr>
                 <a:defRPr/>
               </a:pPr>
-              <a:t>‹#›</a:t>
+              <a:t>‹Nr.›</a:t>
             </a:fld>
             <a:endParaRPr lang="es-ES" altLang="de-DE"/>
           </a:p>
@@ -1680,7 +1680,7 @@
               <a:pPr>
                 <a:defRPr/>
               </a:pPr>
-              <a:t>‹#›</a:t>
+              <a:t>‹Nr.›</a:t>
             </a:fld>
             <a:endParaRPr lang="es-ES" altLang="de-DE"/>
           </a:p>
@@ -1942,7 +1942,7 @@
               <a:pPr>
                 <a:defRPr/>
               </a:pPr>
-              <a:t>‹#›</a:t>
+              <a:t>‹Nr.›</a:t>
             </a:fld>
             <a:endParaRPr lang="es-ES" altLang="de-DE"/>
           </a:p>
@@ -2377,7 +2377,7 @@
               <a:pPr>
                 <a:defRPr/>
               </a:pPr>
-              <a:t>‹#›</a:t>
+              <a:t>‹Nr.›</a:t>
             </a:fld>
             <a:endParaRPr lang="es-ES" altLang="de-DE"/>
           </a:p>
@@ -2525,7 +2525,7 @@
               <a:pPr>
                 <a:defRPr/>
               </a:pPr>
-              <a:t>‹#›</a:t>
+              <a:t>‹Nr.›</a:t>
             </a:fld>
             <a:endParaRPr lang="es-ES" altLang="de-DE"/>
           </a:p>
@@ -2646,7 +2646,7 @@
               <a:pPr>
                 <a:defRPr/>
               </a:pPr>
-              <a:t>‹#›</a:t>
+              <a:t>‹Nr.›</a:t>
             </a:fld>
             <a:endParaRPr lang="es-ES" altLang="de-DE"/>
           </a:p>
@@ -2949,7 +2949,7 @@
               <a:pPr>
                 <a:defRPr/>
               </a:pPr>
-              <a:t>‹#›</a:t>
+              <a:t>‹Nr.›</a:t>
             </a:fld>
             <a:endParaRPr lang="es-ES" altLang="de-DE"/>
           </a:p>
@@ -3229,7 +3229,7 @@
               <a:pPr>
                 <a:defRPr/>
               </a:pPr>
-              <a:t>‹#›</a:t>
+              <a:t>‹Nr.›</a:t>
             </a:fld>
             <a:endParaRPr lang="es-ES" altLang="de-DE"/>
           </a:p>
@@ -3703,7 +3703,7 @@
               <a:pPr>
                 <a:defRPr/>
               </a:pPr>
-              <a:t>‹#›</a:t>
+              <a:t>‹Nr.›</a:t>
             </a:fld>
             <a:endParaRPr lang="es-ES" altLang="de-DE"/>
           </a:p>
@@ -4411,6 +4411,13 @@
   <p:transition spd="slow">
     <p:wipe/>
   </p:transition>
+  <p:timing>
+    <p:tnLst>
+      <p:par>
+        <p:cTn id="1" dur="indefinite" restart="never" nodeType="tmRoot"/>
+      </p:par>
+    </p:tnLst>
+  </p:timing>
 </p:sld>
 </file>
 
@@ -4461,6 +4468,13 @@
   <p:transition spd="slow">
     <p:wipe/>
   </p:transition>
+  <p:timing>
+    <p:tnLst>
+      <p:par>
+        <p:cTn id="1" dur="indefinite" restart="never" nodeType="tmRoot"/>
+      </p:par>
+    </p:tnLst>
+  </p:timing>
 </p:sld>
 </file>
 
@@ -4529,10 +4543,10 @@
               <a:buAutoNum type="arabicPeriod"/>
             </a:pPr>
             <a:r>
-              <a:rPr lang="de-DE" altLang="de-DE" sz="2400" dirty="0" err="1"/>
+              <a:rPr lang="de-DE" altLang="de-DE" sz="2400" dirty="0" err="1" smtClean="0"/>
               <a:t>Begrüssung</a:t>
             </a:r>
-            <a:endParaRPr lang="de-DE" altLang="de-DE" sz="2400" dirty="0"/>
+            <a:endParaRPr lang="de-DE" altLang="de-DE" sz="2400" dirty="0" smtClean="0"/>
           </a:p>
           <a:p>
             <a:pPr marL="457200" indent="-457200" eaLnBrk="1" hangingPunct="1">
@@ -4540,6 +4554,17 @@
               <a:buAutoNum type="arabicPeriod"/>
             </a:pPr>
             <a:r>
+              <a:rPr lang="de-DE" altLang="de-DE" sz="2400" dirty="0" smtClean="0"/>
+              <a:t>Abnahme Protokolle</a:t>
+            </a:r>
+            <a:endParaRPr lang="de-DE" altLang="de-DE" sz="2400" dirty="0"/>
+          </a:p>
+          <a:p>
+            <a:pPr marL="457200" indent="-457200" eaLnBrk="1" hangingPunct="1">
+              <a:buFont typeface="+mj-lt"/>
+              <a:buAutoNum type="arabicPeriod"/>
+            </a:pPr>
+            <a:r>
               <a:rPr lang="de-DE" altLang="de-DE" sz="2400" dirty="0"/>
               <a:t>Besprechung des Projektstandes</a:t>
             </a:r>
@@ -4570,9 +4595,20 @@
               <a:buAutoNum type="arabicPeriod"/>
             </a:pPr>
             <a:r>
-              <a:rPr lang="de-DE" altLang="de-DE" sz="2000" dirty="0"/>
+              <a:rPr lang="de-DE" altLang="de-DE" sz="2000" dirty="0" smtClean="0"/>
               <a:t>Demo</a:t>
             </a:r>
+          </a:p>
+          <a:p>
+            <a:pPr marL="857250" lvl="1" indent="-457200" eaLnBrk="1" hangingPunct="1">
+              <a:buFont typeface="+mj-lt"/>
+              <a:buAutoNum type="arabicPeriod"/>
+            </a:pPr>
+            <a:r>
+              <a:rPr lang="de-DE" altLang="de-DE" sz="2000" dirty="0" smtClean="0"/>
+              <a:t>Tests</a:t>
+            </a:r>
+            <a:endParaRPr lang="de-DE" altLang="de-DE" sz="2000" dirty="0"/>
           </a:p>
           <a:p>
             <a:pPr marL="457200" indent="-457200" eaLnBrk="1" hangingPunct="1">
@@ -4604,6 +4640,13 @@
   <p:transition spd="slow">
     <p:wipe/>
   </p:transition>
+  <p:timing>
+    <p:tnLst>
+      <p:par>
+        <p:cTn id="1" dur="indefinite" restart="never" nodeType="tmRoot"/>
+      </p:par>
+    </p:tnLst>
+  </p:timing>
 </p:sld>
 </file>
 
@@ -4704,6 +4747,13 @@
   <p:transition spd="slow">
     <p:wipe/>
   </p:transition>
+  <p:timing>
+    <p:tnLst>
+      <p:par>
+        <p:cTn id="1" dur="indefinite" restart="never" nodeType="tmRoot"/>
+      </p:par>
+    </p:tnLst>
+  </p:timing>
 </p:sld>
 </file>
 
@@ -5204,6 +5254,13 @@
   <p:transition spd="slow">
     <p:wipe/>
   </p:transition>
+  <p:timing>
+    <p:tnLst>
+      <p:par>
+        <p:cTn id="1" dur="indefinite" restart="never" nodeType="tmRoot"/>
+      </p:par>
+    </p:tnLst>
+  </p:timing>
 </p:sld>
 </file>
 
@@ -5383,6 +5440,13 @@
   <p:transition spd="slow">
     <p:wipe/>
   </p:transition>
+  <p:timing>
+    <p:tnLst>
+      <p:par>
+        <p:cTn id="1" dur="indefinite" restart="never" nodeType="tmRoot"/>
+      </p:par>
+    </p:tnLst>
+  </p:timing>
 </p:sld>
 </file>
 
@@ -5495,6 +5559,13 @@
   <p:transition spd="slow">
     <p:wipe/>
   </p:transition>
+  <p:timing>
+    <p:tnLst>
+      <p:par>
+        <p:cTn id="1" dur="indefinite" restart="never" nodeType="tmRoot"/>
+      </p:par>
+    </p:tnLst>
+  </p:timing>
 </p:sld>
 </file>
 
@@ -5573,6 +5644,13 @@
   <p:transition spd="slow">
     <p:wipe/>
   </p:transition>
+  <p:timing>
+    <p:tnLst>
+      <p:par>
+        <p:cTn id="1" dur="indefinite" restart="never" nodeType="tmRoot"/>
+      </p:par>
+    </p:tnLst>
+  </p:timing>
 </p:sld>
 </file>
 
@@ -5656,6 +5734,13 @@
   <p:transition spd="slow">
     <p:wipe/>
   </p:transition>
+  <p:timing>
+    <p:tnLst>
+      <p:par>
+        <p:cTn id="1" dur="indefinite" restart="never" nodeType="tmRoot"/>
+      </p:par>
+    </p:tnLst>
+  </p:timing>
 </p:sld>
 </file>
 
@@ -5731,6 +5816,13 @@
   <p:transition spd="slow">
     <p:wipe/>
   </p:transition>
+  <p:timing>
+    <p:tnLst>
+      <p:par>
+        <p:cTn id="1" dur="indefinite" restart="never" nodeType="tmRoot"/>
+      </p:par>
+    </p:tnLst>
+  </p:timing>
 </p:sld>
 </file>
 

</xml_diff>

<commit_message>
creted diagrams and added them to presentation & exported Tests #68
</commit_message>
<xml_diff>
--- a/documents/00_Sitzungen/Meilenstein_3/Meilenstein_3.pptx
+++ b/documents/00_Sitzungen/Meilenstein_3/Meilenstein_3.pptx
@@ -407,7 +407,7 @@
           <a:p>
             <a:fld id="{42219948-3B23-4123-8C0A-8C107FD10B5E}" type="slidenum">
               <a:rPr lang="en-GB" smtClean="0"/>
-              <a:t>‹Nr.›</a:t>
+              <a:t>‹#›</a:t>
             </a:fld>
             <a:endParaRPr lang="en-GB"/>
           </a:p>
@@ -561,19 +561,19 @@
           <a:lstStyle/>
           <a:p>
             <a:r>
-              <a:rPr lang="de-CH" dirty="0" smtClean="0"/>
+              <a:rPr lang="de-CH" dirty="0"/>
               <a:t>Das</a:t>
             </a:r>
             <a:r>
-              <a:rPr lang="de-CH" baseline="0" dirty="0" smtClean="0"/>
+              <a:rPr lang="de-CH" baseline="0" dirty="0"/>
               <a:t> letzte mal nicht abgenommen; Von ihrer Seite noch </a:t>
             </a:r>
             <a:r>
-              <a:rPr lang="de-CH" baseline="0" dirty="0" err="1" smtClean="0"/>
+              <a:rPr lang="de-CH" baseline="0" dirty="0" err="1"/>
               <a:t>anmerkungen</a:t>
             </a:r>
             <a:r>
-              <a:rPr lang="de-CH" baseline="0" dirty="0" smtClean="0"/>
+              <a:rPr lang="de-CH" baseline="0" dirty="0"/>
               <a:t>?</a:t>
             </a:r>
             <a:endParaRPr lang="de-CH" dirty="0"/>
@@ -745,10 +745,9 @@
           <a:lstStyle/>
           <a:p>
             <a:r>
-              <a:rPr lang="de-CH" dirty="0" smtClean="0"/>
+              <a:rPr lang="de-CH" dirty="0"/>
               <a:t>56h geplant</a:t>
             </a:r>
-            <a:endParaRPr lang="de-CH" dirty="0"/>
           </a:p>
         </p:txBody>
       </p:sp>
@@ -833,15 +832,15 @@
           <a:lstStyle/>
           <a:p>
             <a:r>
-              <a:rPr lang="de-CH" dirty="0" err="1" smtClean="0"/>
+              <a:rPr lang="de-CH" dirty="0" err="1"/>
               <a:t>Issues</a:t>
             </a:r>
             <a:r>
-              <a:rPr lang="de-CH" dirty="0" smtClean="0"/>
+              <a:rPr lang="de-CH" dirty="0"/>
               <a:t> wurden immer erst</a:t>
             </a:r>
             <a:r>
-              <a:rPr lang="de-CH" baseline="0" dirty="0" smtClean="0"/>
+              <a:rPr lang="de-CH" baseline="0" dirty="0"/>
               <a:t> geschlossen wenn Tests geschrieben wurden.</a:t>
             </a:r>
             <a:endParaRPr lang="de-CH" dirty="0"/>
@@ -929,35 +928,35 @@
           <a:lstStyle/>
           <a:p>
             <a:r>
-              <a:rPr lang="en-GB" dirty="0" smtClean="0"/>
+              <a:rPr lang="en-GB" dirty="0"/>
               <a:t>72h</a:t>
             </a:r>
             <a:r>
-              <a:rPr lang="en-GB" baseline="0" dirty="0" smtClean="0"/>
+              <a:rPr lang="en-GB" baseline="0" dirty="0"/>
               <a:t> </a:t>
             </a:r>
             <a:r>
-              <a:rPr lang="en-GB" baseline="0" dirty="0" err="1" smtClean="0"/>
+              <a:rPr lang="en-GB" baseline="0" dirty="0" err="1"/>
               <a:t>geplant</a:t>
             </a:r>
             <a:r>
-              <a:rPr lang="en-GB" baseline="0" dirty="0" smtClean="0"/>
+              <a:rPr lang="en-GB" baseline="0" dirty="0"/>
               <a:t>; 30h Tests </a:t>
             </a:r>
             <a:r>
-              <a:rPr lang="en-GB" baseline="0" dirty="0" err="1" smtClean="0"/>
+              <a:rPr lang="en-GB" baseline="0" dirty="0" err="1"/>
               <a:t>Abnahmekriterien</a:t>
             </a:r>
             <a:r>
-              <a:rPr lang="en-GB" baseline="0" dirty="0" smtClean="0"/>
+              <a:rPr lang="en-GB" baseline="0" dirty="0"/>
               <a:t>; 20h </a:t>
             </a:r>
             <a:r>
-              <a:rPr lang="en-GB" baseline="0" dirty="0" err="1" smtClean="0"/>
+              <a:rPr lang="en-GB" baseline="0" dirty="0" err="1"/>
               <a:t>Doku</a:t>
             </a:r>
             <a:r>
-              <a:rPr lang="en-GB" baseline="0" dirty="0" smtClean="0"/>
+              <a:rPr lang="en-GB" baseline="0" dirty="0"/>
               <a:t>; 22h Reserve</a:t>
             </a:r>
             <a:endParaRPr lang="en-GB" dirty="0"/>
@@ -1241,7 +1240,7 @@
               <a:pPr>
                 <a:defRPr/>
               </a:pPr>
-              <a:t>‹Nr.›</a:t>
+              <a:t>‹#›</a:t>
             </a:fld>
             <a:endParaRPr lang="es-ES" altLang="de-DE"/>
           </a:p>
@@ -1437,7 +1436,7 @@
               <a:pPr>
                 <a:defRPr/>
               </a:pPr>
-              <a:t>‹Nr.›</a:t>
+              <a:t>‹#›</a:t>
             </a:fld>
             <a:endParaRPr lang="es-ES" altLang="de-DE"/>
           </a:p>
@@ -1643,7 +1642,7 @@
               <a:pPr>
                 <a:defRPr/>
               </a:pPr>
-              <a:t>‹Nr.›</a:t>
+              <a:t>‹#›</a:t>
             </a:fld>
             <a:endParaRPr lang="es-ES" altLang="de-DE"/>
           </a:p>
@@ -1843,7 +1842,7 @@
               <a:pPr>
                 <a:defRPr/>
               </a:pPr>
-              <a:t>‹Nr.›</a:t>
+              <a:t>‹#›</a:t>
             </a:fld>
             <a:endParaRPr lang="es-ES" altLang="de-DE"/>
           </a:p>
@@ -2061,7 +2060,7 @@
               <a:pPr>
                 <a:defRPr/>
               </a:pPr>
-              <a:t>‹Nr.›</a:t>
+              <a:t>‹#›</a:t>
             </a:fld>
             <a:endParaRPr lang="es-ES" altLang="de-DE"/>
           </a:p>
@@ -2323,7 +2322,7 @@
               <a:pPr>
                 <a:defRPr/>
               </a:pPr>
-              <a:t>‹Nr.›</a:t>
+              <a:t>‹#›</a:t>
             </a:fld>
             <a:endParaRPr lang="es-ES" altLang="de-DE"/>
           </a:p>
@@ -2758,7 +2757,7 @@
               <a:pPr>
                 <a:defRPr/>
               </a:pPr>
-              <a:t>‹Nr.›</a:t>
+              <a:t>‹#›</a:t>
             </a:fld>
             <a:endParaRPr lang="es-ES" altLang="de-DE"/>
           </a:p>
@@ -2906,7 +2905,7 @@
               <a:pPr>
                 <a:defRPr/>
               </a:pPr>
-              <a:t>‹Nr.›</a:t>
+              <a:t>‹#›</a:t>
             </a:fld>
             <a:endParaRPr lang="es-ES" altLang="de-DE"/>
           </a:p>
@@ -3027,7 +3026,7 @@
               <a:pPr>
                 <a:defRPr/>
               </a:pPr>
-              <a:t>‹Nr.›</a:t>
+              <a:t>‹#›</a:t>
             </a:fld>
             <a:endParaRPr lang="es-ES" altLang="de-DE"/>
           </a:p>
@@ -3330,7 +3329,7 @@
               <a:pPr>
                 <a:defRPr/>
               </a:pPr>
-              <a:t>‹Nr.›</a:t>
+              <a:t>‹#›</a:t>
             </a:fld>
             <a:endParaRPr lang="es-ES" altLang="de-DE"/>
           </a:p>
@@ -3610,7 +3609,7 @@
               <a:pPr>
                 <a:defRPr/>
               </a:pPr>
-              <a:t>‹Nr.›</a:t>
+              <a:t>‹#›</a:t>
             </a:fld>
             <a:endParaRPr lang="es-ES" altLang="de-DE"/>
           </a:p>
@@ -4084,7 +4083,7 @@
               <a:pPr>
                 <a:defRPr/>
               </a:pPr>
-              <a:t>‹Nr.›</a:t>
+              <a:t>‹#›</a:t>
             </a:fld>
             <a:endParaRPr lang="es-ES" altLang="de-DE"/>
           </a:p>
@@ -4586,17 +4585,8 @@
               <a:rPr lang="en-US" altLang="de-DE" sz="3200" dirty="0">
                 <a:latin typeface="+mj-lt"/>
               </a:rPr>
-              <a:t> </a:t>
-            </a:r>
-            <a:r>
-              <a:rPr lang="en-US" altLang="de-DE" sz="3200" dirty="0" smtClean="0">
-                <a:latin typeface="+mj-lt"/>
-              </a:rPr>
-              <a:t>3</a:t>
-            </a:r>
-            <a:endParaRPr lang="en-US" altLang="de-DE" sz="3200" dirty="0">
-              <a:latin typeface="+mj-lt"/>
-            </a:endParaRPr>
+              <a:t> 3</a:t>
+            </a:r>
           </a:p>
         </p:txBody>
       </p:sp>
@@ -4801,13 +4791,6 @@
   <p:transition spd="slow">
     <p:wipe/>
   </p:transition>
-  <p:timing>
-    <p:tnLst>
-      <p:par>
-        <p:cTn id="1" dur="indefinite" restart="never" nodeType="tmRoot"/>
-      </p:par>
-    </p:tnLst>
-  </p:timing>
 </p:sld>
 </file>
 
@@ -4949,18 +4932,17 @@
           <a:lstStyle/>
           <a:p>
             <a:r>
-              <a:rPr lang="de-CH" sz="2200" dirty="0" smtClean="0"/>
+              <a:rPr lang="de-CH" sz="2200" dirty="0"/>
               <a:t>M4 </a:t>
             </a:r>
             <a:r>
-              <a:rPr lang="de-CH" sz="2200" dirty="0" err="1" smtClean="0"/>
+              <a:rPr lang="de-CH" sz="2200" dirty="0" err="1"/>
               <a:t>Issues</a:t>
             </a:r>
             <a:r>
-              <a:rPr lang="de-CH" sz="2200" dirty="0" smtClean="0"/>
+              <a:rPr lang="de-CH" sz="2200" dirty="0"/>
               <a:t>:</a:t>
             </a:r>
-            <a:endParaRPr lang="de-CH" sz="2200" dirty="0"/>
           </a:p>
         </p:txBody>
       </p:sp>
@@ -5017,14 +4999,13 @@
           <a:lstStyle/>
           <a:p>
             <a:r>
-              <a:rPr lang="de-CH" sz="2200" dirty="0" err="1" smtClean="0"/>
+              <a:rPr lang="de-CH" sz="2200" dirty="0" err="1"/>
               <a:t>Issues</a:t>
             </a:r>
             <a:r>
-              <a:rPr lang="de-CH" sz="2200" dirty="0" smtClean="0"/>
+              <a:rPr lang="de-CH" sz="2200" dirty="0"/>
               <a:t> aus M3:</a:t>
             </a:r>
-            <a:endParaRPr lang="de-CH" sz="2200" dirty="0"/>
           </a:p>
         </p:txBody>
       </p:sp>
@@ -5051,10 +5032,9 @@
           <a:lstStyle/>
           <a:p>
             <a:r>
-              <a:rPr lang="de-CH" sz="2200" dirty="0" smtClean="0"/>
+              <a:rPr lang="de-CH" sz="2200" dirty="0"/>
               <a:t>+ Tests für Abnahmekriterien</a:t>
             </a:r>
-            <a:endParaRPr lang="de-CH" sz="2200" dirty="0"/>
           </a:p>
         </p:txBody>
       </p:sp>
@@ -5066,13 +5046,6 @@
   <p:transition spd="slow">
     <p:wipe/>
   </p:transition>
-  <p:timing>
-    <p:tnLst>
-      <p:par>
-        <p:cTn id="1" dur="indefinite" restart="never" nodeType="tmRoot"/>
-      </p:par>
-    </p:tnLst>
-  </p:timing>
 </p:sld>
 </file>
 
@@ -5123,13 +5096,6 @@
   <p:transition spd="slow">
     <p:wipe/>
   </p:transition>
-  <p:timing>
-    <p:tnLst>
-      <p:par>
-        <p:cTn id="1" dur="indefinite" restart="never" nodeType="tmRoot"/>
-      </p:par>
-    </p:tnLst>
-  </p:timing>
 </p:sld>
 </file>
 
@@ -5198,10 +5164,9 @@
               <a:buAutoNum type="arabicPeriod"/>
             </a:pPr>
             <a:r>
-              <a:rPr lang="de-DE" altLang="de-DE" sz="2400" dirty="0" smtClean="0"/>
+              <a:rPr lang="de-DE" altLang="de-DE" sz="2400" dirty="0"/>
               <a:t>Abnahme Protokolle</a:t>
             </a:r>
-            <a:endParaRPr lang="de-DE" altLang="de-DE" sz="2400" dirty="0"/>
           </a:p>
           <a:p>
             <a:pPr marL="457200" indent="-457200" eaLnBrk="1" hangingPunct="1">
@@ -5239,7 +5204,7 @@
               <a:buAutoNum type="arabicPeriod"/>
             </a:pPr>
             <a:r>
-              <a:rPr lang="de-DE" altLang="de-DE" sz="2000" dirty="0" smtClean="0"/>
+              <a:rPr lang="de-DE" altLang="de-DE" sz="2000" dirty="0"/>
               <a:t>Demo</a:t>
             </a:r>
           </a:p>
@@ -5249,10 +5214,9 @@
               <a:buAutoNum type="arabicPeriod"/>
             </a:pPr>
             <a:r>
-              <a:rPr lang="de-DE" altLang="de-DE" sz="2000" dirty="0" smtClean="0"/>
+              <a:rPr lang="de-DE" altLang="de-DE" sz="2000" dirty="0"/>
               <a:t>Tests</a:t>
             </a:r>
-            <a:endParaRPr lang="de-DE" altLang="de-DE" sz="2000" dirty="0"/>
           </a:p>
           <a:p>
             <a:pPr marL="457200" indent="-457200" eaLnBrk="1" hangingPunct="1">
@@ -5284,13 +5248,6 @@
   <p:transition spd="slow">
     <p:wipe/>
   </p:transition>
-  <p:timing>
-    <p:tnLst>
-      <p:par>
-        <p:cTn id="1" dur="indefinite" restart="never" nodeType="tmRoot"/>
-      </p:par>
-    </p:tnLst>
-  </p:timing>
 </p:sld>
 </file>
 
@@ -5328,11 +5285,7 @@
           <a:p>
             <a:r>
               <a:rPr lang="de-DE" altLang="de-DE" dirty="0"/>
-              <a:t>Abnahme </a:t>
-            </a:r>
-            <a:r>
-              <a:rPr lang="de-DE" altLang="de-DE" dirty="0" smtClean="0"/>
-              <a:t>Protokolle</a:t>
+              <a:t>Abnahme Protokolle</a:t>
             </a:r>
             <a:endParaRPr lang="de-CH" dirty="0"/>
           </a:p>
@@ -5354,16 +5307,15 @@
           <a:lstStyle/>
           <a:p>
             <a:r>
-              <a:rPr lang="de-CH" dirty="0" smtClean="0"/>
+              <a:rPr lang="de-CH" dirty="0"/>
               <a:t>Meilensteinsitzung 1</a:t>
             </a:r>
           </a:p>
           <a:p>
             <a:r>
-              <a:rPr lang="de-CH" dirty="0" smtClean="0"/>
+              <a:rPr lang="de-CH" dirty="0"/>
               <a:t>Meilensteinsitzung 2</a:t>
             </a:r>
-            <a:endParaRPr lang="de-CH" dirty="0"/>
           </a:p>
         </p:txBody>
       </p:sp>
@@ -5380,13 +5332,6 @@
   <p:transition spd="slow">
     <p:wipe/>
   </p:transition>
-  <p:timing>
-    <p:tnLst>
-      <p:par>
-        <p:cTn id="1" dur="indefinite" restart="never" nodeType="tmRoot"/>
-      </p:par>
-    </p:tnLst>
-  </p:timing>
 </p:sld>
 </file>
 
@@ -5512,10 +5457,9 @@
           <a:lstStyle/>
           <a:p>
             <a:r>
-              <a:rPr lang="de-CH" sz="2200" dirty="0" smtClean="0"/>
+              <a:rPr lang="de-CH" sz="2200" dirty="0"/>
               <a:t>Abgeschlossen:</a:t>
             </a:r>
-            <a:endParaRPr lang="de-CH" sz="2200" dirty="0"/>
           </a:p>
         </p:txBody>
       </p:sp>
@@ -5542,10 +5486,9 @@
           <a:lstStyle/>
           <a:p>
             <a:r>
-              <a:rPr lang="de-CH" sz="2200" dirty="0" smtClean="0"/>
+              <a:rPr lang="de-CH" sz="2200" dirty="0"/>
               <a:t>Noch offen:</a:t>
             </a:r>
-            <a:endParaRPr lang="de-CH" sz="2200" dirty="0"/>
           </a:p>
         </p:txBody>
       </p:sp>
@@ -5557,13 +5500,6 @@
   <p:transition spd="slow">
     <p:wipe/>
   </p:transition>
-  <p:timing>
-    <p:tnLst>
-      <p:par>
-        <p:cTn id="1" dur="indefinite" restart="never" nodeType="tmRoot"/>
-      </p:par>
-    </p:tnLst>
-  </p:timing>
 </p:sld>
 </file>
 
@@ -5613,7 +5549,7 @@
             </a:r>
             <a:r>
               <a:rPr lang="en-GB" dirty="0"/>
-              <a:t> 2</a:t>
+              <a:t> 3</a:t>
             </a:r>
             <a:endParaRPr lang="de-CH" dirty="0"/>
           </a:p>
@@ -5663,6 +5599,14 @@
             </a:r>
             <a:r>
               <a:rPr lang="en-US" dirty="0" err="1"/>
+              <a:t>leicht</a:t>
+            </a:r>
+            <a:r>
+              <a:rPr lang="en-US" dirty="0"/>
+              <a:t> </a:t>
+            </a:r>
+            <a:r>
+              <a:rPr lang="en-US" dirty="0" err="1"/>
               <a:t>überstiegen</a:t>
             </a:r>
             <a:endParaRPr lang="en-US" dirty="0"/>
@@ -5706,13 +5650,11 @@
       </p:sp>
       <p:pic>
         <p:nvPicPr>
-          <p:cNvPr id="8" name="Content Placeholder 7"/>
+          <p:cNvPr id="5" name="Picture 4"/>
           <p:cNvPicPr>
-            <a:picLocks noGrp="1" noChangeAspect="1"/>
+            <a:picLocks noChangeAspect="1"/>
           </p:cNvPicPr>
-          <p:nvPr>
-            <p:ph idx="1"/>
-          </p:nvPr>
+          <p:nvPr/>
         </p:nvPicPr>
         <p:blipFill>
           <a:blip r:embed="rId3"/>
@@ -5722,8 +5664,8 @@
         </p:blipFill>
         <p:spPr>
           <a:xfrm>
-            <a:off x="3419872" y="1340768"/>
-            <a:ext cx="5185305" cy="3598508"/>
+            <a:off x="3779912" y="1484784"/>
+            <a:ext cx="4761389" cy="3298222"/>
           </a:xfrm>
           <a:prstGeom prst="rect">
             <a:avLst/>
@@ -5743,13 +5685,6 @@
   <p:transition spd="slow">
     <p:wipe/>
   </p:transition>
-  <p:timing>
-    <p:tnLst>
-      <p:par>
-        <p:cTn id="1" dur="indefinite" restart="never" nodeType="tmRoot"/>
-      </p:par>
-    </p:tnLst>
-  </p:timing>
 </p:sld>
 </file>
 
@@ -5803,7 +5738,7 @@
       </p:sp>
       <p:pic>
         <p:nvPicPr>
-          <p:cNvPr id="6" name="Picture 5"/>
+          <p:cNvPr id="3" name="Picture 2"/>
           <p:cNvPicPr>
             <a:picLocks noChangeAspect="1"/>
           </p:cNvPicPr>
@@ -5817,8 +5752,8 @@
         </p:blipFill>
         <p:spPr>
           <a:xfrm>
-            <a:off x="539552" y="1772816"/>
-            <a:ext cx="3389061" cy="4194021"/>
+            <a:off x="395536" y="1491310"/>
+            <a:ext cx="3422514" cy="4235419"/>
           </a:xfrm>
           <a:prstGeom prst="rect">
             <a:avLst/>
@@ -5827,7 +5762,7 @@
       </p:pic>
       <p:pic>
         <p:nvPicPr>
-          <p:cNvPr id="10" name="Picture 9"/>
+          <p:cNvPr id="8" name="Picture 7"/>
           <p:cNvPicPr>
             <a:picLocks noChangeAspect="1"/>
           </p:cNvPicPr>
@@ -5841,8 +5776,8 @@
         </p:blipFill>
         <p:spPr>
           <a:xfrm>
-            <a:off x="4283968" y="2420888"/>
-            <a:ext cx="4510695" cy="2376264"/>
+            <a:off x="3995936" y="1916832"/>
+            <a:ext cx="4796742" cy="2526956"/>
           </a:xfrm>
           <a:prstGeom prst="rect">
             <a:avLst/>
@@ -5862,13 +5797,6 @@
   <p:transition spd="slow">
     <p:wipe/>
   </p:transition>
-  <p:timing>
-    <p:tnLst>
-      <p:par>
-        <p:cTn id="1" dur="indefinite" restart="never" nodeType="tmRoot"/>
-      </p:par>
-    </p:tnLst>
-  </p:timing>
 </p:sld>
 </file>
 
@@ -5947,13 +5875,6 @@
   <p:transition spd="slow">
     <p:wipe/>
   </p:transition>
-  <p:timing>
-    <p:tnLst>
-      <p:par>
-        <p:cTn id="1" dur="indefinite" restart="never" nodeType="tmRoot"/>
-      </p:par>
-    </p:tnLst>
-  </p:timing>
 </p:sld>
 </file>
 
@@ -5990,10 +5911,9 @@
           <a:lstStyle/>
           <a:p>
             <a:r>
-              <a:rPr lang="de-CH" dirty="0" smtClean="0"/>
+              <a:rPr lang="de-CH" dirty="0"/>
               <a:t>Tests</a:t>
             </a:r>
-            <a:endParaRPr lang="de-CH" dirty="0"/>
           </a:p>
         </p:txBody>
       </p:sp>
@@ -6013,10 +5933,9 @@
           <a:lstStyle/>
           <a:p>
             <a:r>
-              <a:rPr lang="de-CH" dirty="0" smtClean="0"/>
+              <a:rPr lang="de-CH" dirty="0"/>
               <a:t>106 Tests bis jetzt</a:t>
             </a:r>
-            <a:endParaRPr lang="de-CH" dirty="0"/>
           </a:p>
         </p:txBody>
       </p:sp>
@@ -6030,13 +5949,6 @@
   <p:clrMapOvr>
     <a:masterClrMapping/>
   </p:clrMapOvr>
-  <p:timing>
-    <p:tnLst>
-      <p:par>
-        <p:cTn id="1" dur="indefinite" restart="never" nodeType="tmRoot"/>
-      </p:par>
-    </p:tnLst>
-  </p:timing>
 </p:sld>
 </file>
 
@@ -6120,13 +6032,6 @@
   <p:transition spd="slow">
     <p:wipe/>
   </p:transition>
-  <p:timing>
-    <p:tnLst>
-      <p:par>
-        <p:cTn id="1" dur="indefinite" restart="never" nodeType="tmRoot"/>
-      </p:par>
-    </p:tnLst>
-  </p:timing>
 </p:sld>
 </file>
 

</xml_diff>

<commit_message>
Meilensteinsitzung 3 vorbereited #68
</commit_message>
<xml_diff>
--- a/documents/00_Sitzungen/Meilenstein_3/Meilenstein_3.pptx
+++ b/documents/00_Sitzungen/Meilenstein_3/Meilenstein_3.pptx
@@ -407,7 +407,7 @@
           <a:p>
             <a:fld id="{42219948-3B23-4123-8C0A-8C107FD10B5E}" type="slidenum">
               <a:rPr lang="en-GB" smtClean="0"/>
-              <a:t>‹#›</a:t>
+              <a:t>‹Nr.›</a:t>
             </a:fld>
             <a:endParaRPr lang="en-GB"/>
           </a:p>
@@ -660,6 +660,22 @@
           <a:bodyPr/>
           <a:lstStyle/>
           <a:p>
+            <a:r>
+              <a:rPr lang="de-CH" dirty="0" smtClean="0"/>
+              <a:t>UI-Design mit </a:t>
+            </a:r>
+            <a:r>
+              <a:rPr lang="de-CH" dirty="0" err="1" smtClean="0"/>
+              <a:t>farbe</a:t>
+            </a:r>
+            <a:r>
+              <a:rPr lang="de-CH" dirty="0" smtClean="0"/>
+              <a:t>; Suche nach Dateien; Modul bearbeiten</a:t>
+            </a:r>
+            <a:r>
+              <a:rPr lang="de-CH" baseline="0" dirty="0" smtClean="0"/>
+              <a:t>/erstellen</a:t>
+            </a:r>
             <a:endParaRPr lang="de-CH" dirty="0"/>
           </a:p>
         </p:txBody>
@@ -745,9 +761,14 @@
           <a:lstStyle/>
           <a:p>
             <a:r>
-              <a:rPr lang="de-CH" dirty="0"/>
-              <a:t>56h geplant</a:t>
-            </a:r>
+              <a:rPr lang="de-CH" dirty="0" smtClean="0"/>
+              <a:t>55h</a:t>
+            </a:r>
+            <a:r>
+              <a:rPr lang="de-CH" baseline="0" dirty="0" smtClean="0"/>
+              <a:t> geplant; 3.5h länger gehabt</a:t>
+            </a:r>
+            <a:endParaRPr lang="de-CH" dirty="0"/>
           </a:p>
         </p:txBody>
       </p:sp>
@@ -832,6 +853,98 @@
           <a:lstStyle/>
           <a:p>
             <a:r>
+              <a:rPr lang="de-CH" dirty="0" smtClean="0"/>
+              <a:t>168h bis jetzt geplant;</a:t>
+            </a:r>
+            <a:r>
+              <a:rPr lang="de-CH" baseline="0" dirty="0" smtClean="0"/>
+              <a:t> jetzt noch 10h darunter</a:t>
+            </a:r>
+            <a:endParaRPr lang="de-CH" dirty="0"/>
+          </a:p>
+        </p:txBody>
+      </p:sp>
+      <p:sp>
+        <p:nvSpPr>
+          <p:cNvPr id="4" name="Foliennummernplatzhalter 3"/>
+          <p:cNvSpPr>
+            <a:spLocks noGrp="1"/>
+          </p:cNvSpPr>
+          <p:nvPr>
+            <p:ph type="sldNum" sz="quarter" idx="10"/>
+          </p:nvPr>
+        </p:nvSpPr>
+        <p:spPr/>
+        <p:txBody>
+          <a:bodyPr/>
+          <a:lstStyle/>
+          <a:p>
+            <a:fld id="{42219948-3B23-4123-8C0A-8C107FD10B5E}" type="slidenum">
+              <a:rPr lang="en-GB" smtClean="0"/>
+              <a:t>6</a:t>
+            </a:fld>
+            <a:endParaRPr lang="en-GB"/>
+          </a:p>
+        </p:txBody>
+      </p:sp>
+    </p:spTree>
+    <p:extLst>
+      <p:ext uri="{BB962C8B-B14F-4D97-AF65-F5344CB8AC3E}">
+        <p14:creationId xmlns:p14="http://schemas.microsoft.com/office/powerpoint/2010/main" val="4144977512"/>
+      </p:ext>
+    </p:extLst>
+  </p:cSld>
+  <p:clrMapOvr>
+    <a:masterClrMapping/>
+  </p:clrMapOvr>
+</p:notes>
+</file>
+
+<file path=ppt/notesSlides/notesSlide5.xml><?xml version="1.0" encoding="utf-8"?>
+<p:notes xmlns:a="http://schemas.openxmlformats.org/drawingml/2006/main" xmlns:r="http://schemas.openxmlformats.org/officeDocument/2006/relationships" xmlns:p="http://schemas.openxmlformats.org/presentationml/2006/main">
+  <p:cSld>
+    <p:spTree>
+      <p:nvGrpSpPr>
+        <p:cNvPr id="1" name=""/>
+        <p:cNvGrpSpPr/>
+        <p:nvPr/>
+      </p:nvGrpSpPr>
+      <p:grpSpPr>
+        <a:xfrm>
+          <a:off x="0" y="0"/>
+          <a:ext cx="0" cy="0"/>
+          <a:chOff x="0" y="0"/>
+          <a:chExt cx="0" cy="0"/>
+        </a:xfrm>
+      </p:grpSpPr>
+      <p:sp>
+        <p:nvSpPr>
+          <p:cNvPr id="2" name="Folienbildplatzhalter 1"/>
+          <p:cNvSpPr>
+            <a:spLocks noGrp="1" noRot="1" noChangeAspect="1"/>
+          </p:cNvSpPr>
+          <p:nvPr>
+            <p:ph type="sldImg"/>
+          </p:nvPr>
+        </p:nvSpPr>
+        <p:spPr/>
+      </p:sp>
+      <p:sp>
+        <p:nvSpPr>
+          <p:cNvPr id="3" name="Notizenplatzhalter 2"/>
+          <p:cNvSpPr>
+            <a:spLocks noGrp="1"/>
+          </p:cNvSpPr>
+          <p:nvPr>
+            <p:ph type="body" idx="1"/>
+          </p:nvPr>
+        </p:nvSpPr>
+        <p:spPr/>
+        <p:txBody>
+          <a:bodyPr/>
+          <a:lstStyle/>
+          <a:p>
+            <a:r>
               <a:rPr lang="de-CH" dirty="0" err="1"/>
               <a:t>Issues</a:t>
             </a:r>
@@ -883,7 +996,7 @@
 </p:notes>
 </file>
 
-<file path=ppt/notesSlides/notesSlide5.xml><?xml version="1.0" encoding="utf-8"?>
+<file path=ppt/notesSlides/notesSlide6.xml><?xml version="1.0" encoding="utf-8"?>
 <p:notes xmlns:a="http://schemas.openxmlformats.org/drawingml/2006/main" xmlns:r="http://schemas.openxmlformats.org/officeDocument/2006/relationships" xmlns:p="http://schemas.openxmlformats.org/presentationml/2006/main">
   <p:cSld>
     <p:spTree>
@@ -1240,7 +1353,7 @@
               <a:pPr>
                 <a:defRPr/>
               </a:pPr>
-              <a:t>‹#›</a:t>
+              <a:t>‹Nr.›</a:t>
             </a:fld>
             <a:endParaRPr lang="es-ES" altLang="de-DE"/>
           </a:p>
@@ -1436,7 +1549,7 @@
               <a:pPr>
                 <a:defRPr/>
               </a:pPr>
-              <a:t>‹#›</a:t>
+              <a:t>‹Nr.›</a:t>
             </a:fld>
             <a:endParaRPr lang="es-ES" altLang="de-DE"/>
           </a:p>
@@ -1642,7 +1755,7 @@
               <a:pPr>
                 <a:defRPr/>
               </a:pPr>
-              <a:t>‹#›</a:t>
+              <a:t>‹Nr.›</a:t>
             </a:fld>
             <a:endParaRPr lang="es-ES" altLang="de-DE"/>
           </a:p>
@@ -1842,7 +1955,7 @@
               <a:pPr>
                 <a:defRPr/>
               </a:pPr>
-              <a:t>‹#›</a:t>
+              <a:t>‹Nr.›</a:t>
             </a:fld>
             <a:endParaRPr lang="es-ES" altLang="de-DE"/>
           </a:p>
@@ -2060,7 +2173,7 @@
               <a:pPr>
                 <a:defRPr/>
               </a:pPr>
-              <a:t>‹#›</a:t>
+              <a:t>‹Nr.›</a:t>
             </a:fld>
             <a:endParaRPr lang="es-ES" altLang="de-DE"/>
           </a:p>
@@ -2322,7 +2435,7 @@
               <a:pPr>
                 <a:defRPr/>
               </a:pPr>
-              <a:t>‹#›</a:t>
+              <a:t>‹Nr.›</a:t>
             </a:fld>
             <a:endParaRPr lang="es-ES" altLang="de-DE"/>
           </a:p>
@@ -2757,7 +2870,7 @@
               <a:pPr>
                 <a:defRPr/>
               </a:pPr>
-              <a:t>‹#›</a:t>
+              <a:t>‹Nr.›</a:t>
             </a:fld>
             <a:endParaRPr lang="es-ES" altLang="de-DE"/>
           </a:p>
@@ -2905,7 +3018,7 @@
               <a:pPr>
                 <a:defRPr/>
               </a:pPr>
-              <a:t>‹#›</a:t>
+              <a:t>‹Nr.›</a:t>
             </a:fld>
             <a:endParaRPr lang="es-ES" altLang="de-DE"/>
           </a:p>
@@ -3026,7 +3139,7 @@
               <a:pPr>
                 <a:defRPr/>
               </a:pPr>
-              <a:t>‹#›</a:t>
+              <a:t>‹Nr.›</a:t>
             </a:fld>
             <a:endParaRPr lang="es-ES" altLang="de-DE"/>
           </a:p>
@@ -3329,7 +3442,7 @@
               <a:pPr>
                 <a:defRPr/>
               </a:pPr>
-              <a:t>‹#›</a:t>
+              <a:t>‹Nr.›</a:t>
             </a:fld>
             <a:endParaRPr lang="es-ES" altLang="de-DE"/>
           </a:p>
@@ -3609,7 +3722,7 @@
               <a:pPr>
                 <a:defRPr/>
               </a:pPr>
-              <a:t>‹#›</a:t>
+              <a:t>‹Nr.›</a:t>
             </a:fld>
             <a:endParaRPr lang="es-ES" altLang="de-DE"/>
           </a:p>
@@ -4083,7 +4196,7 @@
               <a:pPr>
                 <a:defRPr/>
               </a:pPr>
-              <a:t>‹#›</a:t>
+              <a:t>‹Nr.›</a:t>
             </a:fld>
             <a:endParaRPr lang="es-ES" altLang="de-DE"/>
           </a:p>
@@ -4791,6 +4904,13 @@
   <p:transition spd="slow">
     <p:wipe/>
   </p:transition>
+  <p:timing>
+    <p:tnLst>
+      <p:par>
+        <p:cTn id="1" dur="indefinite" restart="never" nodeType="tmRoot"/>
+      </p:par>
+    </p:tnLst>
+  </p:timing>
 </p:sld>
 </file>
 
@@ -4946,9 +5066,71 @@
           </a:p>
         </p:txBody>
       </p:sp>
+      <p:sp>
+        <p:nvSpPr>
+          <p:cNvPr id="12" name="Textfeld 11"/>
+          <p:cNvSpPr txBox="1"/>
+          <p:nvPr/>
+        </p:nvSpPr>
+        <p:spPr>
+          <a:xfrm>
+            <a:off x="4638283" y="1367463"/>
+            <a:ext cx="3787468" cy="430887"/>
+          </a:xfrm>
+          <a:prstGeom prst="rect">
+            <a:avLst/>
+          </a:prstGeom>
+          <a:noFill/>
+        </p:spPr>
+        <p:txBody>
+          <a:bodyPr wrap="square" rtlCol="0">
+            <a:spAutoFit/>
+          </a:bodyPr>
+          <a:lstStyle/>
+          <a:p>
+            <a:r>
+              <a:rPr lang="de-CH" sz="2200" dirty="0" err="1"/>
+              <a:t>Issues</a:t>
+            </a:r>
+            <a:r>
+              <a:rPr lang="de-CH" sz="2200" dirty="0"/>
+              <a:t> aus M3:</a:t>
+            </a:r>
+          </a:p>
+        </p:txBody>
+      </p:sp>
+      <p:sp>
+        <p:nvSpPr>
+          <p:cNvPr id="13" name="Textfeld 12"/>
+          <p:cNvSpPr txBox="1"/>
+          <p:nvPr/>
+        </p:nvSpPr>
+        <p:spPr>
+          <a:xfrm>
+            <a:off x="390917" y="3560081"/>
+            <a:ext cx="4181083" cy="430887"/>
+          </a:xfrm>
+          <a:prstGeom prst="rect">
+            <a:avLst/>
+          </a:prstGeom>
+          <a:noFill/>
+        </p:spPr>
+        <p:txBody>
+          <a:bodyPr wrap="square" rtlCol="0">
+            <a:spAutoFit/>
+          </a:bodyPr>
+          <a:lstStyle/>
+          <a:p>
+            <a:r>
+              <a:rPr lang="de-CH" sz="2200" dirty="0"/>
+              <a:t>+ Tests für Abnahmekriterien</a:t>
+            </a:r>
+          </a:p>
+        </p:txBody>
+      </p:sp>
       <p:pic>
         <p:nvPicPr>
-          <p:cNvPr id="9" name="Grafik 8"/>
+          <p:cNvPr id="2" name="Grafik 1"/>
           <p:cNvPicPr>
             <a:picLocks noChangeAspect="1"/>
           </p:cNvPicPr>
@@ -4969,75 +5151,13 @@
         <p:spPr>
           <a:xfrm>
             <a:off x="4638283" y="1870358"/>
-            <a:ext cx="3894157" cy="3718882"/>
+            <a:ext cx="3901778" cy="2324301"/>
           </a:xfrm>
           <a:prstGeom prst="rect">
             <a:avLst/>
           </a:prstGeom>
         </p:spPr>
       </p:pic>
-      <p:sp>
-        <p:nvSpPr>
-          <p:cNvPr id="12" name="Textfeld 11"/>
-          <p:cNvSpPr txBox="1"/>
-          <p:nvPr/>
-        </p:nvSpPr>
-        <p:spPr>
-          <a:xfrm>
-            <a:off x="4638283" y="1367463"/>
-            <a:ext cx="3787468" cy="430887"/>
-          </a:xfrm>
-          <a:prstGeom prst="rect">
-            <a:avLst/>
-          </a:prstGeom>
-          <a:noFill/>
-        </p:spPr>
-        <p:txBody>
-          <a:bodyPr wrap="square" rtlCol="0">
-            <a:spAutoFit/>
-          </a:bodyPr>
-          <a:lstStyle/>
-          <a:p>
-            <a:r>
-              <a:rPr lang="de-CH" sz="2200" dirty="0" err="1"/>
-              <a:t>Issues</a:t>
-            </a:r>
-            <a:r>
-              <a:rPr lang="de-CH" sz="2200" dirty="0"/>
-              <a:t> aus M3:</a:t>
-            </a:r>
-          </a:p>
-        </p:txBody>
-      </p:sp>
-      <p:sp>
-        <p:nvSpPr>
-          <p:cNvPr id="13" name="Textfeld 12"/>
-          <p:cNvSpPr txBox="1"/>
-          <p:nvPr/>
-        </p:nvSpPr>
-        <p:spPr>
-          <a:xfrm>
-            <a:off x="390917" y="3560081"/>
-            <a:ext cx="4181083" cy="430887"/>
-          </a:xfrm>
-          <a:prstGeom prst="rect">
-            <a:avLst/>
-          </a:prstGeom>
-          <a:noFill/>
-        </p:spPr>
-        <p:txBody>
-          <a:bodyPr wrap="square" rtlCol="0">
-            <a:spAutoFit/>
-          </a:bodyPr>
-          <a:lstStyle/>
-          <a:p>
-            <a:r>
-              <a:rPr lang="de-CH" sz="2200" dirty="0"/>
-              <a:t>+ Tests für Abnahmekriterien</a:t>
-            </a:r>
-          </a:p>
-        </p:txBody>
-      </p:sp>
     </p:spTree>
   </p:cSld>
   <p:clrMapOvr>
@@ -5046,6 +5166,13 @@
   <p:transition spd="slow">
     <p:wipe/>
   </p:transition>
+  <p:timing>
+    <p:tnLst>
+      <p:par>
+        <p:cTn id="1" dur="indefinite" restart="never" nodeType="tmRoot"/>
+      </p:par>
+    </p:tnLst>
+  </p:timing>
 </p:sld>
 </file>
 
@@ -5096,6 +5223,13 @@
   <p:transition spd="slow">
     <p:wipe/>
   </p:transition>
+  <p:timing>
+    <p:tnLst>
+      <p:par>
+        <p:cTn id="1" dur="indefinite" restart="never" nodeType="tmRoot"/>
+      </p:par>
+    </p:tnLst>
+  </p:timing>
 </p:sld>
 </file>
 
@@ -5248,6 +5382,13 @@
   <p:transition spd="slow">
     <p:wipe/>
   </p:transition>
+  <p:timing>
+    <p:tnLst>
+      <p:par>
+        <p:cTn id="1" dur="indefinite" restart="never" nodeType="tmRoot"/>
+      </p:par>
+    </p:tnLst>
+  </p:timing>
 </p:sld>
 </file>
 
@@ -5332,6 +5473,13 @@
   <p:transition spd="slow">
     <p:wipe/>
   </p:transition>
+  <p:timing>
+    <p:tnLst>
+      <p:par>
+        <p:cTn id="1" dur="indefinite" restart="never" nodeType="tmRoot"/>
+      </p:par>
+    </p:tnLst>
+  </p:timing>
 </p:sld>
 </file>
 
@@ -5354,7 +5502,7 @@
       </p:grpSpPr>
       <p:pic>
         <p:nvPicPr>
-          <p:cNvPr id="4" name="Inhaltsplatzhalter 3"/>
+          <p:cNvPr id="6" name="Inhaltsplatzhalter 5"/>
           <p:cNvPicPr>
             <a:picLocks noGrp="1" noChangeAspect="1"/>
           </p:cNvPicPr>
@@ -5376,8 +5524,8 @@
         </p:blipFill>
         <p:spPr>
           <a:xfrm>
-            <a:off x="4588025" y="2123358"/>
-            <a:ext cx="4232447" cy="4041946"/>
+            <a:off x="4588024" y="2123358"/>
+            <a:ext cx="4098775" cy="2441653"/>
           </a:xfrm>
         </p:spPr>
       </p:pic>
@@ -5404,9 +5552,67 @@
           </a:p>
         </p:txBody>
       </p:sp>
+      <p:sp>
+        <p:nvSpPr>
+          <p:cNvPr id="7" name="Textfeld 6"/>
+          <p:cNvSpPr txBox="1"/>
+          <p:nvPr/>
+        </p:nvSpPr>
+        <p:spPr>
+          <a:xfrm>
+            <a:off x="457200" y="1631811"/>
+            <a:ext cx="3787468" cy="430887"/>
+          </a:xfrm>
+          <a:prstGeom prst="rect">
+            <a:avLst/>
+          </a:prstGeom>
+          <a:noFill/>
+        </p:spPr>
+        <p:txBody>
+          <a:bodyPr wrap="square" rtlCol="0">
+            <a:spAutoFit/>
+          </a:bodyPr>
+          <a:lstStyle/>
+          <a:p>
+            <a:r>
+              <a:rPr lang="de-CH" sz="2200" dirty="0"/>
+              <a:t>Abgeschlossen:</a:t>
+            </a:r>
+          </a:p>
+        </p:txBody>
+      </p:sp>
+      <p:sp>
+        <p:nvSpPr>
+          <p:cNvPr id="9" name="Textfeld 8"/>
+          <p:cNvSpPr txBox="1"/>
+          <p:nvPr/>
+        </p:nvSpPr>
+        <p:spPr>
+          <a:xfrm>
+            <a:off x="4588025" y="1631810"/>
+            <a:ext cx="3787468" cy="430887"/>
+          </a:xfrm>
+          <a:prstGeom prst="rect">
+            <a:avLst/>
+          </a:prstGeom>
+          <a:noFill/>
+        </p:spPr>
+        <p:txBody>
+          <a:bodyPr wrap="square" rtlCol="0">
+            <a:spAutoFit/>
+          </a:bodyPr>
+          <a:lstStyle/>
+          <a:p>
+            <a:r>
+              <a:rPr lang="de-CH" sz="2200" dirty="0"/>
+              <a:t>Noch offen:</a:t>
+            </a:r>
+          </a:p>
+        </p:txBody>
+      </p:sp>
       <p:pic>
         <p:nvPicPr>
-          <p:cNvPr id="2" name="Grafik 1"/>
+          <p:cNvPr id="3" name="Grafik 2"/>
           <p:cNvPicPr>
             <a:picLocks noChangeAspect="1"/>
           </p:cNvPicPr>
@@ -5426,72 +5632,14 @@
         </p:blipFill>
         <p:spPr>
           <a:xfrm>
-            <a:off x="457200" y="2123358"/>
-            <a:ext cx="4021060" cy="2435290"/>
+            <a:off x="459837" y="2123358"/>
+            <a:ext cx="3886537" cy="3688400"/>
           </a:xfrm>
           <a:prstGeom prst="rect">
             <a:avLst/>
           </a:prstGeom>
         </p:spPr>
       </p:pic>
-      <p:sp>
-        <p:nvSpPr>
-          <p:cNvPr id="7" name="Textfeld 6"/>
-          <p:cNvSpPr txBox="1"/>
-          <p:nvPr/>
-        </p:nvSpPr>
-        <p:spPr>
-          <a:xfrm>
-            <a:off x="457200" y="1631811"/>
-            <a:ext cx="3787468" cy="430887"/>
-          </a:xfrm>
-          <a:prstGeom prst="rect">
-            <a:avLst/>
-          </a:prstGeom>
-          <a:noFill/>
-        </p:spPr>
-        <p:txBody>
-          <a:bodyPr wrap="square" rtlCol="0">
-            <a:spAutoFit/>
-          </a:bodyPr>
-          <a:lstStyle/>
-          <a:p>
-            <a:r>
-              <a:rPr lang="de-CH" sz="2200" dirty="0"/>
-              <a:t>Abgeschlossen:</a:t>
-            </a:r>
-          </a:p>
-        </p:txBody>
-      </p:sp>
-      <p:sp>
-        <p:nvSpPr>
-          <p:cNvPr id="9" name="Textfeld 8"/>
-          <p:cNvSpPr txBox="1"/>
-          <p:nvPr/>
-        </p:nvSpPr>
-        <p:spPr>
-          <a:xfrm>
-            <a:off x="4588025" y="1631810"/>
-            <a:ext cx="3787468" cy="430887"/>
-          </a:xfrm>
-          <a:prstGeom prst="rect">
-            <a:avLst/>
-          </a:prstGeom>
-          <a:noFill/>
-        </p:spPr>
-        <p:txBody>
-          <a:bodyPr wrap="square" rtlCol="0">
-            <a:spAutoFit/>
-          </a:bodyPr>
-          <a:lstStyle/>
-          <a:p>
-            <a:r>
-              <a:rPr lang="de-CH" sz="2200" dirty="0"/>
-              <a:t>Noch offen:</a:t>
-            </a:r>
-          </a:p>
-        </p:txBody>
-      </p:sp>
     </p:spTree>
   </p:cSld>
   <p:clrMapOvr>
@@ -5500,6 +5648,13 @@
   <p:transition spd="slow">
     <p:wipe/>
   </p:transition>
+  <p:timing>
+    <p:tnLst>
+      <p:par>
+        <p:cTn id="1" dur="indefinite" restart="never" nodeType="tmRoot"/>
+      </p:par>
+    </p:tnLst>
+  </p:timing>
 </p:sld>
 </file>
 
@@ -5685,6 +5840,13 @@
   <p:transition spd="slow">
     <p:wipe/>
   </p:transition>
+  <p:timing>
+    <p:tnLst>
+      <p:par>
+        <p:cTn id="1" dur="indefinite" restart="never" nodeType="tmRoot"/>
+      </p:par>
+    </p:tnLst>
+  </p:timing>
 </p:sld>
 </file>
 
@@ -5745,7 +5907,7 @@
           <p:nvPr/>
         </p:nvPicPr>
         <p:blipFill>
-          <a:blip r:embed="rId2"/>
+          <a:blip r:embed="rId3"/>
           <a:stretch>
             <a:fillRect/>
           </a:stretch>
@@ -5769,7 +5931,7 @@
           <p:nvPr/>
         </p:nvPicPr>
         <p:blipFill>
-          <a:blip r:embed="rId3"/>
+          <a:blip r:embed="rId4"/>
           <a:stretch>
             <a:fillRect/>
           </a:stretch>
@@ -5797,6 +5959,13 @@
   <p:transition spd="slow">
     <p:wipe/>
   </p:transition>
+  <p:timing>
+    <p:tnLst>
+      <p:par>
+        <p:cTn id="1" dur="indefinite" restart="never" nodeType="tmRoot"/>
+      </p:par>
+    </p:tnLst>
+  </p:timing>
 </p:sld>
 </file>
 
@@ -5875,6 +6044,13 @@
   <p:transition spd="slow">
     <p:wipe/>
   </p:transition>
+  <p:timing>
+    <p:tnLst>
+      <p:par>
+        <p:cTn id="1" dur="indefinite" restart="never" nodeType="tmRoot"/>
+      </p:par>
+    </p:tnLst>
+  </p:timing>
 </p:sld>
 </file>
 
@@ -5934,8 +6110,39 @@
           <a:p>
             <a:r>
               <a:rPr lang="de-CH" dirty="0"/>
-              <a:t>106 Tests bis jetzt</a:t>
-            </a:r>
+              <a:t>106 Tests bis </a:t>
+            </a:r>
+            <a:r>
+              <a:rPr lang="de-CH" dirty="0" smtClean="0"/>
+              <a:t>jetzt</a:t>
+            </a:r>
+          </a:p>
+          <a:p>
+            <a:r>
+              <a:rPr lang="de-CH" dirty="0" smtClean="0"/>
+              <a:t>3 noch </a:t>
+            </a:r>
+            <a:r>
+              <a:rPr lang="de-CH" dirty="0" smtClean="0"/>
+              <a:t>«</a:t>
+            </a:r>
+            <a:r>
+              <a:rPr lang="de-CH" dirty="0" err="1" smtClean="0"/>
+              <a:t>ignored</a:t>
+            </a:r>
+            <a:r>
+              <a:rPr lang="de-CH" dirty="0" smtClean="0"/>
+              <a:t>», </a:t>
+            </a:r>
+            <a:r>
+              <a:rPr lang="de-CH" dirty="0" smtClean="0"/>
+              <a:t>weil noch in </a:t>
+            </a:r>
+            <a:r>
+              <a:rPr lang="de-CH" dirty="0" smtClean="0"/>
+              <a:t>Arbeit.</a:t>
+            </a:r>
+            <a:endParaRPr lang="de-CH" dirty="0"/>
           </a:p>
         </p:txBody>
       </p:sp>
@@ -5949,6 +6156,13 @@
   <p:clrMapOvr>
     <a:masterClrMapping/>
   </p:clrMapOvr>
+  <p:timing>
+    <p:tnLst>
+      <p:par>
+        <p:cTn id="1" dur="indefinite" restart="never" nodeType="tmRoot"/>
+      </p:par>
+    </p:tnLst>
+  </p:timing>
 </p:sld>
 </file>
 
@@ -6032,6 +6246,13 @@
   <p:transition spd="slow">
     <p:wipe/>
   </p:transition>
+  <p:timing>
+    <p:tnLst>
+      <p:par>
+        <p:cTn id="1" dur="indefinite" restart="never" nodeType="tmRoot"/>
+      </p:par>
+    </p:tnLst>
+  </p:timing>
 </p:sld>
 </file>
 

</xml_diff>